<commit_message>
Updated presentation (visio schemas)
</commit_message>
<xml_diff>
--- a/ShibbolethExtensions.pptx
+++ b/ShibbolethExtensions.pptx
@@ -5577,7 +5577,13 @@
               <a:rPr lang="it-IT" sz="2400" dirty="0">
                 <a:latin typeface="Calibri" pitchFamily="34" charset="0"/>
               </a:rPr>
-              <a:t> e loro attivazione (tramite configurazione), </a:t>
+              <a:t> e loro attivazione (tramite configurazione</a:t>
+            </a:r>
+            <a:r>
+              <a:rPr lang="it-IT" sz="2400" dirty="0" smtClean="0">
+                <a:latin typeface="Calibri" pitchFamily="34" charset="0"/>
+              </a:rPr>
+              <a:t>); </a:t>
             </a:r>
             <a:r>
               <a:rPr lang="it-IT" sz="2400" dirty="0" err="1">
@@ -5652,26 +5658,29 @@
               <a:rPr lang="it-IT" sz="2400" dirty="0">
                 <a:latin typeface="Calibri" pitchFamily="34" charset="0"/>
               </a:rPr>
-              <a:t>: modifiche solo a livello dei file di configurazione del </a:t>
-            </a:r>
-            <a:r>
-              <a:rPr lang="it-IT" sz="2400" dirty="0" err="1">
+              <a:t>: modifiche solo a livello dei file di configurazione </a:t>
+            </a:r>
+            <a:r>
+              <a:rPr lang="it-IT" sz="2400" dirty="0" smtClean="0">
+                <a:latin typeface="Calibri" pitchFamily="34" charset="0"/>
+              </a:rPr>
+              <a:t>dell’SP </a:t>
+            </a:r>
+            <a:r>
+              <a:rPr lang="it-IT" sz="2400" dirty="0" err="1" smtClean="0">
                 <a:latin typeface="Calibri" pitchFamily="34" charset="0"/>
               </a:rPr>
               <a:t>Shibboleth</a:t>
             </a:r>
             <a:r>
-              <a:rPr lang="it-IT" sz="2400" dirty="0">
-                <a:latin typeface="Calibri" pitchFamily="34" charset="0"/>
-              </a:rPr>
-              <a:t> SP</a:t>
-            </a:r>
-            <a:r>
               <a:rPr lang="it-IT" sz="2400" dirty="0" smtClean="0">
                 <a:latin typeface="Calibri" pitchFamily="34" charset="0"/>
               </a:rPr>
               <a:t>.</a:t>
             </a:r>
+            <a:endParaRPr lang="it-IT" sz="2400" dirty="0" smtClean="0">
+              <a:latin typeface="Calibri" pitchFamily="34" charset="0"/>
+            </a:endParaRPr>
           </a:p>
           <a:p>
             <a:pPr marL="796925" lvl="1" eaLnBrk="1" hangingPunct="1">
@@ -5951,17 +5960,29 @@
               <a:rPr lang="it-IT" sz="2400" dirty="0">
                 <a:latin typeface="Calibri" pitchFamily="34" charset="0"/>
               </a:rPr>
-              <a:t>Le estensioni mantengono inalterati i concetti di uniformità e distribuzione che garantiscono la dimensione di comunità di IDEM</a:t>
+              <a:t>Le estensioni </a:t>
             </a:r>
             <a:r>
               <a:rPr lang="it-IT" sz="2400" dirty="0" smtClean="0">
                 <a:latin typeface="Calibri" pitchFamily="34" charset="0"/>
               </a:rPr>
-              <a:t>.</a:t>
-            </a:r>
-          </a:p>
-          <a:p>
-            <a:pPr lvl="1" eaLnBrk="1" hangingPunct="1">
+              <a:t>non alterano i </a:t>
+            </a:r>
+            <a:r>
+              <a:rPr lang="it-IT" sz="2400" dirty="0">
+                <a:latin typeface="Calibri" pitchFamily="34" charset="0"/>
+              </a:rPr>
+              <a:t>concetti </a:t>
+            </a:r>
+            <a:r>
+              <a:rPr lang="it-IT" sz="2400" dirty="0" smtClean="0">
+                <a:latin typeface="Calibri" pitchFamily="34" charset="0"/>
+              </a:rPr>
+              <a:t>comunitari di IDEM:</a:t>
+            </a:r>
+          </a:p>
+          <a:p>
+            <a:pPr marL="630238" lvl="1" eaLnBrk="1" hangingPunct="1">
               <a:spcBef>
                 <a:spcPct val="0"/>
               </a:spcBef>
@@ -5971,12 +5992,15 @@
               <a:buSzPct val="60000"/>
               <a:defRPr/>
             </a:pPr>
-            <a:endParaRPr lang="it-IT" sz="2400" dirty="0" smtClean="0">
-              <a:latin typeface="Calibri" pitchFamily="34" charset="0"/>
-            </a:endParaRPr>
-          </a:p>
-          <a:p>
-            <a:pPr marL="796925" lvl="1" eaLnBrk="1" hangingPunct="1">
+            <a:r>
+              <a:rPr lang="it-IT" sz="2000" dirty="0" smtClean="0">
+                <a:latin typeface="Calibri" pitchFamily="34" charset="0"/>
+              </a:rPr>
+              <a:t>uniformità d’accesso e di gestione dei metadati</a:t>
+            </a:r>
+          </a:p>
+          <a:p>
+            <a:pPr marL="630238" lvl="1" eaLnBrk="1" hangingPunct="1">
               <a:spcBef>
                 <a:spcPct val="0"/>
               </a:spcBef>
@@ -5986,6 +6010,12 @@
               <a:buSzPct val="60000"/>
               <a:defRPr/>
             </a:pPr>
+            <a:r>
+              <a:rPr lang="it-IT" sz="2000" dirty="0" smtClean="0">
+                <a:latin typeface="Calibri" pitchFamily="34" charset="0"/>
+              </a:rPr>
+              <a:t>gestione federata e distribuita dell’AAI</a:t>
+            </a:r>
             <a:endParaRPr lang="it-IT" sz="2000" dirty="0" smtClean="0">
               <a:latin typeface="Calibri" pitchFamily="34" charset="0"/>
             </a:endParaRPr>
@@ -6330,7 +6360,7 @@
               <a:t> e </a:t>
             </a:r>
             <a:r>
-              <a:rPr lang="it-IT" sz="2400" dirty="0">
+              <a:rPr lang="it-IT" sz="2400" dirty="0" smtClean="0">
                 <a:latin typeface="Arial Unicode MS"/>
                 <a:ea typeface="Arial Unicode MS"/>
                 <a:cs typeface="Arial Unicode MS"/>
@@ -6371,13 +6401,13 @@
               <a:rPr lang="it-IT" sz="2400" dirty="0">
                 <a:latin typeface="Calibri" pitchFamily="34" charset="0"/>
               </a:rPr>
-              <a:t> della federazione</a:t>
+              <a:t> della </a:t>
             </a:r>
             <a:r>
               <a:rPr lang="it-IT" sz="2400" dirty="0" smtClean="0">
                 <a:latin typeface="Calibri" pitchFamily="34" charset="0"/>
               </a:rPr>
-              <a:t>.</a:t>
+              <a:t>federazione (e quindi non bastano interventi solo lato SP).</a:t>
             </a:r>
             <a:endParaRPr lang="it-IT" sz="2400" dirty="0">
               <a:latin typeface="Calibri" pitchFamily="34" charset="0"/>
@@ -6447,14 +6477,14 @@
           <a:p>
             <a:pPr eaLnBrk="1" hangingPunct="1"/>
             <a:r>
-              <a:rPr lang="en-GB" sz="2800" b="0" dirty="0" err="1" smtClean="0">
+              <a:rPr lang="it-IT" sz="2800" b="0" smtClean="0">
                 <a:latin typeface="Arial Unicode MS"/>
                 <a:ea typeface="Arial Unicode MS"/>
                 <a:cs typeface="Arial Unicode MS"/>
               </a:rPr>
               <a:t>Conclusioni</a:t>
             </a:r>
-            <a:endParaRPr lang="en-GB" sz="2800" b="0" dirty="0" smtClean="0">
+            <a:endParaRPr lang="it-IT" sz="2800" b="0" smtClean="0">
               <a:latin typeface="Calibri" pitchFamily="34" charset="0"/>
             </a:endParaRPr>
           </a:p>
@@ -6491,22 +6521,10 @@
               <a:defRPr/>
             </a:pPr>
             <a:r>
-              <a:rPr lang="it-IT" sz="2400" dirty="0">
-                <a:latin typeface="Calibri" pitchFamily="34" charset="0"/>
-              </a:rPr>
-              <a:t>L’</a:t>
-            </a:r>
-            <a:r>
-              <a:rPr lang="it-IT" sz="2400" dirty="0" err="1">
-                <a:latin typeface="Calibri" pitchFamily="34" charset="0"/>
-              </a:rPr>
-              <a:t>estenzione</a:t>
-            </a:r>
-            <a:r>
-              <a:rPr lang="it-IT" sz="2400" dirty="0">
-                <a:latin typeface="Calibri" pitchFamily="34" charset="0"/>
-              </a:rPr>
-              <a:t> </a:t>
+              <a:rPr lang="it-IT" sz="2400" dirty="0" smtClean="0">
+                <a:latin typeface="Calibri" pitchFamily="34" charset="0"/>
+              </a:rPr>
+              <a:t>L’estensione </a:t>
             </a:r>
             <a:r>
               <a:rPr lang="it-IT" sz="2400" dirty="0">
@@ -6705,14 +6723,14 @@
           <a:p>
             <a:pPr eaLnBrk="1" hangingPunct="1"/>
             <a:r>
-              <a:rPr lang="en-GB" sz="2800" b="0" dirty="0" err="1" smtClean="0">
+              <a:rPr lang="it-IT" sz="2800" b="0" smtClean="0">
                 <a:latin typeface="Arial Unicode MS"/>
                 <a:ea typeface="Arial Unicode MS"/>
                 <a:cs typeface="Arial Unicode MS"/>
               </a:rPr>
               <a:t>Condivisione</a:t>
             </a:r>
-            <a:endParaRPr lang="en-GB" sz="2800" b="0" dirty="0" smtClean="0">
+            <a:endParaRPr lang="it-IT" sz="2800" b="0" smtClean="0">
               <a:latin typeface="Calibri" pitchFamily="34" charset="0"/>
             </a:endParaRPr>
           </a:p>
@@ -6981,20 +6999,23 @@
               <a:rPr lang="it-IT" sz="2400" dirty="0" smtClean="0">
                 <a:latin typeface="Calibri" pitchFamily="34" charset="0"/>
               </a:rPr>
-              <a:t> [</a:t>
+              <a:t> [web-</a:t>
             </a:r>
             <a:r>
               <a:rPr lang="it-IT" sz="2400" dirty="0" err="1" smtClean="0">
                 <a:latin typeface="Calibri" pitchFamily="34" charset="0"/>
               </a:rPr>
-              <a:t>web-based</a:t>
+              <a:t>based</a:t>
             </a:r>
             <a:r>
               <a:rPr lang="it-IT" sz="2400" dirty="0" smtClean="0">
                 <a:latin typeface="Calibri" pitchFamily="34" charset="0"/>
               </a:rPr>
-              <a:t>]»</a:t>
-            </a:r>
+              <a:t>]».</a:t>
+            </a:r>
+            <a:endParaRPr lang="it-IT" sz="2400" dirty="0" smtClean="0">
+              <a:latin typeface="Calibri" pitchFamily="34" charset="0"/>
+            </a:endParaRPr>
           </a:p>
           <a:p>
             <a:pPr lvl="1" eaLnBrk="1" hangingPunct="1">
@@ -7034,6 +7055,12 @@
               </a:rPr>
               <a:t>username+password</a:t>
             </a:r>
+            <a:r>
+              <a:rPr lang="it-IT" sz="2400" dirty="0" smtClean="0">
+                <a:latin typeface="Calibri" pitchFamily="34" charset="0"/>
+              </a:rPr>
+              <a:t>.</a:t>
+            </a:r>
             <a:endParaRPr lang="it-IT" sz="2400" dirty="0" smtClean="0">
               <a:latin typeface="Calibri" pitchFamily="34" charset="0"/>
             </a:endParaRPr>
@@ -7068,7 +7095,19 @@
               <a:rPr lang="it-IT" sz="2400" dirty="0" smtClean="0">
                 <a:latin typeface="Calibri" pitchFamily="34" charset="0"/>
               </a:rPr>
-              <a:t>Principi generai:</a:t>
+              <a:t>Principi </a:t>
+            </a:r>
+            <a:r>
+              <a:rPr lang="it-IT" sz="2400" dirty="0" smtClean="0">
+                <a:latin typeface="Calibri" pitchFamily="34" charset="0"/>
+              </a:rPr>
+              <a:t>generali</a:t>
+            </a:r>
+            <a:r>
+              <a:rPr lang="it-IT" sz="2400" dirty="0" smtClean="0">
+                <a:latin typeface="Calibri" pitchFamily="34" charset="0"/>
+              </a:rPr>
+              <a:t>:</a:t>
             </a:r>
           </a:p>
           <a:p>
@@ -7251,13 +7290,37 @@
               <a:rPr lang="it-IT" sz="2400" dirty="0" smtClean="0">
                 <a:latin typeface="Calibri" pitchFamily="34" charset="0"/>
               </a:rPr>
-              <a:t> e quindi accedute non tramite browser web</a:t>
+              <a:t> </a:t>
             </a:r>
             <a:r>
               <a:rPr lang="it-IT" sz="2400" dirty="0" smtClean="0">
                 <a:latin typeface="Calibri" pitchFamily="34" charset="0"/>
               </a:rPr>
-              <a:t>.</a:t>
+              <a:t>che </a:t>
+            </a:r>
+            <a:r>
+              <a:rPr lang="it-IT" sz="2400" dirty="0" smtClean="0">
+                <a:latin typeface="Calibri" pitchFamily="34" charset="0"/>
+              </a:rPr>
+              <a:t>quindi </a:t>
+            </a:r>
+            <a:r>
+              <a:rPr lang="it-IT" sz="2400" dirty="0" smtClean="0">
+                <a:latin typeface="Calibri" pitchFamily="34" charset="0"/>
+              </a:rPr>
+              <a:t>non si utilizzano un browser web (API per Java e </a:t>
+            </a:r>
+            <a:r>
+              <a:rPr lang="it-IT" sz="2400" dirty="0" err="1" smtClean="0">
+                <a:latin typeface="Calibri" pitchFamily="34" charset="0"/>
+              </a:rPr>
+              <a:t>Phyton</a:t>
+            </a:r>
+            <a:r>
+              <a:rPr lang="it-IT" sz="2400" dirty="0" smtClean="0">
+                <a:latin typeface="Calibri" pitchFamily="34" charset="0"/>
+              </a:rPr>
+              <a:t>).</a:t>
             </a:r>
             <a:endParaRPr lang="it-IT" sz="2400" dirty="0" smtClean="0">
               <a:latin typeface="Calibri" pitchFamily="34" charset="0"/>
@@ -7293,8 +7356,17 @@
               <a:rPr lang="it-IT" sz="2400" dirty="0">
                 <a:latin typeface="Calibri" pitchFamily="34" charset="0"/>
               </a:rPr>
-              <a:t>Estensione di IDEM per l’autenticazione di utenti su sistemi Linux.</a:t>
-            </a:r>
+              <a:t>Estensione di IDEM per l’autenticazione di utenti su sistemi </a:t>
+            </a:r>
+            <a:r>
+              <a:rPr lang="it-IT" sz="2400" dirty="0" smtClean="0">
+                <a:latin typeface="Calibri" pitchFamily="34" charset="0"/>
+              </a:rPr>
+              <a:t>Linux (tramite PAM e NSS).</a:t>
+            </a:r>
+            <a:endParaRPr lang="it-IT" sz="2400" dirty="0">
+              <a:latin typeface="Calibri" pitchFamily="34" charset="0"/>
+            </a:endParaRPr>
           </a:p>
           <a:p>
             <a:pPr lvl="1" eaLnBrk="1" hangingPunct="1">
@@ -7342,9 +7414,6 @@
               </a:rPr>
               <a:t>).</a:t>
             </a:r>
-            <a:endParaRPr lang="it-IT" sz="2400" dirty="0">
-              <a:latin typeface="Calibri" pitchFamily="34" charset="0"/>
-            </a:endParaRPr>
           </a:p>
           <a:p>
             <a:pPr lvl="1" eaLnBrk="1" hangingPunct="1">
@@ -7535,44 +7604,47 @@
               <a:rPr lang="it-IT" sz="2400" dirty="0">
                 <a:latin typeface="Calibri" pitchFamily="34" charset="0"/>
               </a:rPr>
-              <a:t>: il problema ci si è presentato quando per il progetto </a:t>
-            </a:r>
-            <a:r>
-              <a:rPr lang="it-IT" sz="2400" dirty="0" err="1">
-                <a:latin typeface="Calibri" pitchFamily="34" charset="0"/>
-              </a:rPr>
-              <a:t>GarrBox</a:t>
-            </a:r>
-            <a:r>
-              <a:rPr lang="it-IT" sz="2400" dirty="0">
-                <a:latin typeface="Calibri" pitchFamily="34" charset="0"/>
-              </a:rPr>
-              <a:t> abbiamo pensato come includere in </a:t>
-            </a:r>
-            <a:r>
-              <a:rPr lang="it-IT" sz="2400" dirty="0" err="1">
+              <a:t>: </a:t>
+            </a:r>
+            <a:r>
+              <a:rPr lang="it-IT" sz="2400" dirty="0" smtClean="0">
+                <a:latin typeface="Calibri" pitchFamily="34" charset="0"/>
+              </a:rPr>
+              <a:t>attraverso le API realizzate è possibile avere applicazioni client scritta in </a:t>
+            </a:r>
+            <a:r>
+              <a:rPr lang="it-IT" sz="2400" dirty="0" smtClean="0">
+                <a:latin typeface="Calibri" pitchFamily="34" charset="0"/>
+              </a:rPr>
+              <a:t>Java o in </a:t>
+            </a:r>
+            <a:r>
+              <a:rPr lang="it-IT" sz="2400" dirty="0" err="1" smtClean="0">
+                <a:latin typeface="Calibri" pitchFamily="34" charset="0"/>
+              </a:rPr>
+              <a:t>Python</a:t>
+            </a:r>
+            <a:r>
+              <a:rPr lang="it-IT" sz="2400" dirty="0" smtClean="0">
+                <a:latin typeface="Calibri" pitchFamily="34" charset="0"/>
+              </a:rPr>
+              <a:t> che effettuano un’autenticazione tramite </a:t>
+            </a:r>
+            <a:r>
+              <a:rPr lang="it-IT" sz="2400" dirty="0" err="1" smtClean="0">
                 <a:latin typeface="Calibri" pitchFamily="34" charset="0"/>
               </a:rPr>
               <a:t>Shibboleth</a:t>
             </a:r>
             <a:r>
-              <a:rPr lang="it-IT" sz="2400" dirty="0">
-                <a:latin typeface="Calibri" pitchFamily="34" charset="0"/>
-              </a:rPr>
-              <a:t> interfacce a blocchi per i </a:t>
-            </a:r>
-            <a:r>
-              <a:rPr lang="it-IT" sz="2400" dirty="0" err="1">
-                <a:latin typeface="Calibri" pitchFamily="34" charset="0"/>
-              </a:rPr>
-              <a:t>filesystem</a:t>
-            </a:r>
-            <a:r>
-              <a:rPr lang="it-IT" sz="2400" dirty="0">
-                <a:latin typeface="Calibri" pitchFamily="34" charset="0"/>
-              </a:rPr>
-              <a:t> (CIFS e NFS), le quali non transitano da browser web.</a:t>
-            </a:r>
+              <a:rPr lang="it-IT" sz="2400" dirty="0" smtClean="0">
+                <a:latin typeface="Calibri" pitchFamily="34" charset="0"/>
+              </a:rPr>
+              <a:t> (con una gestione completa dei metadati utente nella sessione).</a:t>
+            </a:r>
+            <a:endParaRPr lang="it-IT" sz="2400" dirty="0">
+              <a:latin typeface="Calibri" pitchFamily="34" charset="0"/>
+            </a:endParaRPr>
           </a:p>
           <a:p>
             <a:pPr marL="796925" lvl="1" eaLnBrk="1" hangingPunct="1">
@@ -7745,20 +7817,17 @@
               <a:rPr lang="it-IT" sz="2400" dirty="0">
                 <a:latin typeface="Calibri" pitchFamily="34" charset="0"/>
               </a:rPr>
-              <a:t>: grazie a queste estensioni la federazione IDEM è in grado di essere usata per autenticare utenti su macchine </a:t>
-            </a:r>
-            <a:r>
-              <a:rPr lang="it-IT" sz="2400" dirty="0" err="1">
-                <a:latin typeface="Calibri" pitchFamily="34" charset="0"/>
-              </a:rPr>
-              <a:t>Linxu</a:t>
-            </a:r>
-            <a:r>
-              <a:rPr lang="it-IT" sz="2400" dirty="0">
-                <a:latin typeface="Calibri" pitchFamily="34" charset="0"/>
-              </a:rPr>
-              <a:t>.</a:t>
-            </a:r>
+              <a:t>: grazie a queste estensioni la federazione IDEM è in grado di essere usata </a:t>
+            </a:r>
+            <a:r>
+              <a:rPr lang="it-IT" sz="2400" dirty="0" smtClean="0">
+                <a:latin typeface="Calibri" pitchFamily="34" charset="0"/>
+              </a:rPr>
+              <a:t>come strumento di autenticazione per macchine Linux.</a:t>
+            </a:r>
+            <a:endParaRPr lang="it-IT" sz="2400" dirty="0">
+              <a:latin typeface="Calibri" pitchFamily="34" charset="0"/>
+            </a:endParaRPr>
           </a:p>
           <a:p>
             <a:pPr lvl="1" eaLnBrk="1" hangingPunct="1">
@@ -7994,25 +8063,25 @@
           <p:nvPr>
             <p:extLst>
               <p:ext uri="{D42A27DB-BD31-4B8C-83A1-F6EECF244321}">
-                <p14:modId xmlns:p14="http://schemas.microsoft.com/office/powerpoint/2010/main" val="3553273154"/>
+                <p14:modId xmlns:p14="http://schemas.microsoft.com/office/powerpoint/2010/main" val="3688795485"/>
               </p:ext>
             </p:extLst>
           </p:nvPr>
         </p:nvGraphicFramePr>
         <p:xfrm>
-          <a:off x="769938" y="939800"/>
-          <a:ext cx="7672387" cy="5478463"/>
+          <a:off x="1164768" y="1234455"/>
+          <a:ext cx="6501562" cy="4641128"/>
         </p:xfrm>
         <a:graphic>
           <a:graphicData uri="http://schemas.openxmlformats.org/presentationml/2006/ole">
             <mc:AlternateContent xmlns:mc="http://schemas.openxmlformats.org/markup-compatibility/2006">
               <mc:Choice xmlns:v="urn:schemas-microsoft-com:vml" Requires="v">
-                <p:oleObj spid="_x0000_s3078" name="Visio" r:id="rId4" imgW="5788679" imgH="4132634" progId="Visio.Drawing.11">
+                <p:oleObj spid="_x0000_s3080" name="Visio" r:id="rId4" imgW="5284611" imgH="3772440" progId="Visio.Drawing.11">
                   <p:embed/>
                 </p:oleObj>
               </mc:Choice>
               <mc:Fallback>
-                <p:oleObj name="Visio" r:id="rId4" imgW="5788679" imgH="4132634" progId="Visio.Drawing.11">
+                <p:oleObj name="Visio" r:id="rId4" imgW="5284611" imgH="3772440" progId="Visio.Drawing.11">
                   <p:embed/>
                   <p:pic>
                     <p:nvPicPr>
@@ -8023,13 +8092,7 @@
                       <p:nvPr/>
                     </p:nvPicPr>
                     <p:blipFill>
-                      <a:blip r:embed="rId5">
-                        <a:extLst>
-                          <a:ext uri="{28A0092B-C50C-407E-A947-70E740481C1C}">
-                            <a14:useLocalDpi xmlns:a14="http://schemas.microsoft.com/office/drawing/2010/main" val="0"/>
-                          </a:ext>
-                        </a:extLst>
-                      </a:blip>
+                      <a:blip r:embed="rId5"/>
                       <a:srcRect/>
                       <a:stretch>
                         <a:fillRect/>
@@ -8037,8 +8100,8 @@
                     </p:blipFill>
                     <p:spPr bwMode="auto">
                       <a:xfrm>
-                        <a:off x="769938" y="939800"/>
-                        <a:ext cx="7672387" cy="5478463"/>
+                        <a:off x="1164768" y="1234455"/>
+                        <a:ext cx="6501562" cy="4641128"/>
                       </a:xfrm>
                       <a:prstGeom prst="rect">
                         <a:avLst/>
@@ -8047,25 +8110,7 @@
                       <a:ln>
                         <a:noFill/>
                       </a:ln>
-                      <a:extLst>
-                        <a:ext uri="{909E8E84-426E-40DD-AFC4-6F175D3DCCD1}">
-                          <a14:hiddenFill xmlns:a14="http://schemas.microsoft.com/office/drawing/2010/main">
-                            <a:solidFill>
-                              <a:srgbClr val="FFFFFF"/>
-                            </a:solidFill>
-                          </a14:hiddenFill>
-                        </a:ext>
-                        <a:ext uri="{91240B29-F687-4F45-9708-019B960494DF}">
-                          <a14:hiddenLine xmlns:a14="http://schemas.microsoft.com/office/drawing/2010/main" w="9525">
-                            <a:solidFill>
-                              <a:srgbClr val="000000"/>
-                            </a:solidFill>
-                            <a:miter lim="800000"/>
-                            <a:headEnd/>
-                            <a:tailEnd/>
-                          </a14:hiddenLine>
-                        </a:ext>
-                      </a:extLst>
+                      <a:extLst/>
                     </p:spPr>
                   </p:pic>
                 </p:oleObj>
@@ -8293,7 +8338,19 @@
               <a:rPr lang="it-IT" sz="2400" dirty="0">
                 <a:latin typeface="Calibri" pitchFamily="34" charset="0"/>
               </a:rPr>
-              <a:t> per fornire gli elenchi di utenti e gruppi da LDAP e attivazione (tramite configurazione) del Basic </a:t>
+              <a:t> per fornire gli elenchi di utenti e gruppi da </a:t>
+            </a:r>
+            <a:r>
+              <a:rPr lang="it-IT" sz="2400" dirty="0" smtClean="0">
+                <a:latin typeface="Calibri" pitchFamily="34" charset="0"/>
+              </a:rPr>
+              <a:t>LDAP </a:t>
+            </a:r>
+            <a:r>
+              <a:rPr lang="it-IT" sz="2400" dirty="0">
+                <a:latin typeface="Calibri" pitchFamily="34" charset="0"/>
+              </a:rPr>
+              <a:t>e attivazione (tramite configurazione) del Basic </a:t>
             </a:r>
             <a:r>
               <a:rPr lang="it-IT" sz="2400" dirty="0" err="1">
@@ -8387,48 +8444,78 @@
                 <a:latin typeface="Calibri" pitchFamily="34" charset="0"/>
               </a:rPr>
             </a:br>
+            <a:endParaRPr lang="it-IT" sz="2400" dirty="0" smtClean="0">
+              <a:latin typeface="Calibri" pitchFamily="34" charset="0"/>
+            </a:endParaRPr>
+          </a:p>
+          <a:p>
+            <a:pPr lvl="1" eaLnBrk="1" hangingPunct="1">
+              <a:spcBef>
+                <a:spcPct val="0"/>
+              </a:spcBef>
+              <a:spcAft>
+                <a:spcPct val="20000"/>
+              </a:spcAft>
+              <a:buSzPct val="60000"/>
+              <a:defRPr/>
+            </a:pPr>
+            <a:r>
+              <a:rPr lang="it-IT" sz="2400" b="1" dirty="0" smtClean="0">
+                <a:latin typeface="Calibri" pitchFamily="34" charset="0"/>
+              </a:rPr>
+              <a:t>Applicazione</a:t>
+            </a:r>
+            <a:r>
+              <a:rPr lang="it-IT" sz="2400" dirty="0" smtClean="0">
+                <a:latin typeface="Calibri" pitchFamily="34" charset="0"/>
+              </a:rPr>
+              <a:t>: inclusione delle librerie con le </a:t>
+            </a:r>
+            <a:r>
+              <a:rPr lang="it-IT" sz="2400" dirty="0" smtClean="0">
+                <a:latin typeface="Calibri" pitchFamily="34" charset="0"/>
+              </a:rPr>
+              <a:t>API </a:t>
+            </a:r>
             <a:r>
               <a:rPr lang="it-IT" sz="2400" dirty="0">
                 <a:latin typeface="Calibri" pitchFamily="34" charset="0"/>
               </a:rPr>
-              <a:t>Sono inoltre state realizzate delle API per integrare l’autenticazione </a:t>
-            </a:r>
-            <a:r>
-              <a:rPr lang="it-IT" sz="2400" dirty="0" err="1">
+              <a:t>per integrare l’autenticazione </a:t>
+            </a:r>
+            <a:r>
+              <a:rPr lang="it-IT" sz="2400" dirty="0" err="1" smtClean="0">
                 <a:latin typeface="Calibri" pitchFamily="34" charset="0"/>
               </a:rPr>
               <a:t>Shibboleth</a:t>
             </a:r>
             <a:r>
-              <a:rPr lang="it-IT" sz="2400" dirty="0">
-                <a:latin typeface="Calibri" pitchFamily="34" charset="0"/>
-              </a:rPr>
-              <a:t> in </a:t>
-            </a:r>
-            <a:r>
-              <a:rPr lang="it-IT" sz="2400" dirty="0" err="1">
-                <a:latin typeface="Calibri" pitchFamily="34" charset="0"/>
-              </a:rPr>
-              <a:t>applicazionei</a:t>
-            </a:r>
-            <a:r>
-              <a:rPr lang="it-IT" sz="2400" dirty="0">
-                <a:latin typeface="Calibri" pitchFamily="34" charset="0"/>
-              </a:rPr>
-              <a:t> Java e </a:t>
-            </a:r>
-            <a:r>
-              <a:rPr lang="it-IT" sz="2400" dirty="0" err="1">
-                <a:latin typeface="Calibri" pitchFamily="34" charset="0"/>
-              </a:rPr>
-              <a:t>Python</a:t>
-            </a:r>
-            <a:r>
-              <a:rPr lang="it-IT" sz="2400" dirty="0">
+              <a:rPr lang="it-IT" sz="2400" dirty="0" smtClean="0">
+                <a:latin typeface="Calibri" pitchFamily="34" charset="0"/>
+              </a:rPr>
+              <a:t>; per il login di macchine </a:t>
+            </a:r>
+            <a:r>
+              <a:rPr lang="it-IT" sz="2400" dirty="0" err="1" smtClean="0">
+                <a:latin typeface="Calibri" pitchFamily="34" charset="0"/>
+              </a:rPr>
+              <a:t>linux</a:t>
+            </a:r>
+            <a:r>
+              <a:rPr lang="it-IT" sz="2400" dirty="0" smtClean="0">
+                <a:latin typeface="Calibri" pitchFamily="34" charset="0"/>
+              </a:rPr>
+              <a:t> vengono forniti un modulo PAM e NSS da installare e configurare sulla macchina client</a:t>
+            </a:r>
+            <a:r>
+              <a:rPr lang="it-IT" sz="2400" dirty="0" smtClean="0">
                 <a:latin typeface="Calibri" pitchFamily="34" charset="0"/>
               </a:rPr>
               <a:t>.</a:t>
             </a:r>
+            <a:endParaRPr lang="it-IT" sz="2400" dirty="0">
+              <a:latin typeface="Calibri" pitchFamily="34" charset="0"/>
+            </a:endParaRPr>
           </a:p>
           <a:p>
             <a:pPr lvl="1" eaLnBrk="1" hangingPunct="1">
@@ -8616,7 +8703,19 @@
               <a:rPr lang="it-IT" sz="2400" dirty="0">
                 <a:latin typeface="Calibri" pitchFamily="34" charset="0"/>
               </a:rPr>
-              <a:t>: grazie a queste estensione la federazione IDEM è in grado di raggiungere e includere applicazioni che usano protocolli di autenticazione sofisticati.</a:t>
+              <a:t>: grazie a queste estensione la federazione IDEM </a:t>
+            </a:r>
+            <a:r>
+              <a:rPr lang="it-IT" sz="2400" dirty="0" smtClean="0">
+                <a:latin typeface="Calibri" pitchFamily="34" charset="0"/>
+              </a:rPr>
+              <a:t>può estendersi a includere </a:t>
+            </a:r>
+            <a:r>
+              <a:rPr lang="it-IT" sz="2400" dirty="0">
+                <a:latin typeface="Calibri" pitchFamily="34" charset="0"/>
+              </a:rPr>
+              <a:t>applicazioni che usano protocolli di autenticazione sofisticati.</a:t>
             </a:r>
           </a:p>
           <a:p>
@@ -8850,25 +8949,25 @@
           <p:nvPr>
             <p:extLst>
               <p:ext uri="{D42A27DB-BD31-4B8C-83A1-F6EECF244321}">
-                <p14:modId xmlns:p14="http://schemas.microsoft.com/office/powerpoint/2010/main" val="692204502"/>
+                <p14:modId xmlns:p14="http://schemas.microsoft.com/office/powerpoint/2010/main" val="2716706697"/>
               </p:ext>
             </p:extLst>
           </p:nvPr>
         </p:nvGraphicFramePr>
         <p:xfrm>
-          <a:off x="769938" y="939800"/>
-          <a:ext cx="7672387" cy="5478463"/>
+          <a:off x="1246188" y="1225923"/>
+          <a:ext cx="6718300" cy="4597400"/>
         </p:xfrm>
         <a:graphic>
           <a:graphicData uri="http://schemas.openxmlformats.org/presentationml/2006/ole">
             <mc:AlternateContent xmlns:mc="http://schemas.openxmlformats.org/markup-compatibility/2006">
               <mc:Choice xmlns:v="urn:schemas-microsoft-com:vml" Requires="v">
-                <p:oleObj spid="_x0000_s4101" name="Visio" r:id="rId4" imgW="5788679" imgH="4132634" progId="Visio.Drawing.11">
+                <p:oleObj spid="_x0000_s4103" name="Visio" r:id="rId4" imgW="5068504" imgH="3466560" progId="Visio.Drawing.11">
                   <p:embed/>
                 </p:oleObj>
               </mc:Choice>
               <mc:Fallback>
-                <p:oleObj name="Visio" r:id="rId4" imgW="5788679" imgH="4132634" progId="Visio.Drawing.11">
+                <p:oleObj name="Visio" r:id="rId4" imgW="5068504" imgH="3466560" progId="Visio.Drawing.11">
                   <p:embed/>
                   <p:pic>
                     <p:nvPicPr>
@@ -8879,13 +8978,7 @@
                       <p:nvPr/>
                     </p:nvPicPr>
                     <p:blipFill>
-                      <a:blip r:embed="rId5">
-                        <a:extLst>
-                          <a:ext uri="{28A0092B-C50C-407E-A947-70E740481C1C}">
-                            <a14:useLocalDpi xmlns:a14="http://schemas.microsoft.com/office/drawing/2010/main" val="0"/>
-                          </a:ext>
-                        </a:extLst>
-                      </a:blip>
+                      <a:blip r:embed="rId5"/>
                       <a:srcRect/>
                       <a:stretch>
                         <a:fillRect/>
@@ -8893,8 +8986,8 @@
                     </p:blipFill>
                     <p:spPr bwMode="auto">
                       <a:xfrm>
-                        <a:off x="769938" y="939800"/>
-                        <a:ext cx="7672387" cy="5478463"/>
+                        <a:off x="1246188" y="1225923"/>
+                        <a:ext cx="6718300" cy="4597400"/>
                       </a:xfrm>
                       <a:prstGeom prst="rect">
                         <a:avLst/>

</xml_diff>